<commit_message>
fix pipeline image to show that I used google maps instead of mapbox to render KML shape. modified description to include links to the Data BC geocoder. they do provide developer apikeys now so anyone can request the use ot Data BC's batch geocoder with no CORS restriction
</commit_message>
<xml_diff>
--- a/img/pipeline.pptx
+++ b/img/pipeline.pptx
@@ -4,6 +4,9 @@
   <p:sldMasterIdLst>
     <p:sldMasterId id="2147483648" r:id="rId1"/>
   </p:sldMasterIdLst>
+  <p:notesMasterIdLst>
+    <p:notesMasterId r:id="rId4"/>
+  </p:notesMasterIdLst>
   <p:sldIdLst>
     <p:sldId id="256" r:id="rId2"/>
     <p:sldId id="257" r:id="rId3"/>
@@ -105,7 +108,362 @@
       </a:defRPr>
     </a:lvl9pPr>
   </p:defaultTextStyle>
+  <p:extLst>
+    <p:ext uri="{EFAFB233-063F-42B5-8137-9DF3F51BA10A}">
+      <p15:sldGuideLst xmlns:p15="http://schemas.microsoft.com/office/powerpoint/2012/main"/>
+    </p:ext>
+  </p:extLst>
 </p:presentation>
+</file>
+
+<file path=ppt/notesMasters/notesMaster1.xml><?xml version="1.0" encoding="utf-8"?>
+<p:notesMaster xmlns:a="http://schemas.openxmlformats.org/drawingml/2006/main" xmlns:r="http://schemas.openxmlformats.org/officeDocument/2006/relationships" xmlns:p="http://schemas.openxmlformats.org/presentationml/2006/main">
+  <p:cSld>
+    <p:bg>
+      <p:bgRef idx="1001">
+        <a:schemeClr val="bg1"/>
+      </p:bgRef>
+    </p:bg>
+    <p:spTree>
+      <p:nvGrpSpPr>
+        <p:cNvPr id="1" name=""/>
+        <p:cNvGrpSpPr/>
+        <p:nvPr/>
+      </p:nvGrpSpPr>
+      <p:grpSpPr>
+        <a:xfrm>
+          <a:off x="0" y="0"/>
+          <a:ext cx="0" cy="0"/>
+          <a:chOff x="0" y="0"/>
+          <a:chExt cx="0" cy="0"/>
+        </a:xfrm>
+      </p:grpSpPr>
+      <p:sp>
+        <p:nvSpPr>
+          <p:cNvPr id="2" name="Header Placeholder 1"/>
+          <p:cNvSpPr>
+            <a:spLocks noGrp="1"/>
+          </p:cNvSpPr>
+          <p:nvPr>
+            <p:ph type="hdr" sz="quarter"/>
+          </p:nvPr>
+        </p:nvSpPr>
+        <p:spPr>
+          <a:xfrm>
+            <a:off x="0" y="0"/>
+            <a:ext cx="2971800" cy="458788"/>
+          </a:xfrm>
+          <a:prstGeom prst="rect">
+            <a:avLst/>
+          </a:prstGeom>
+        </p:spPr>
+        <p:txBody>
+          <a:bodyPr vert="horz" lIns="91440" tIns="45720" rIns="91440" bIns="45720" rtlCol="0"/>
+          <a:lstStyle>
+            <a:lvl1pPr algn="l">
+              <a:defRPr sz="1200"/>
+            </a:lvl1pPr>
+          </a:lstStyle>
+          <a:p>
+            <a:endParaRPr lang="en-US"/>
+          </a:p>
+        </p:txBody>
+      </p:sp>
+      <p:sp>
+        <p:nvSpPr>
+          <p:cNvPr id="3" name="Date Placeholder 2"/>
+          <p:cNvSpPr>
+            <a:spLocks noGrp="1"/>
+          </p:cNvSpPr>
+          <p:nvPr>
+            <p:ph type="dt" idx="1"/>
+          </p:nvPr>
+        </p:nvSpPr>
+        <p:spPr>
+          <a:xfrm>
+            <a:off x="3884613" y="0"/>
+            <a:ext cx="2971800" cy="458788"/>
+          </a:xfrm>
+          <a:prstGeom prst="rect">
+            <a:avLst/>
+          </a:prstGeom>
+        </p:spPr>
+        <p:txBody>
+          <a:bodyPr vert="horz" lIns="91440" tIns="45720" rIns="91440" bIns="45720" rtlCol="0"/>
+          <a:lstStyle>
+            <a:lvl1pPr algn="r">
+              <a:defRPr sz="1200"/>
+            </a:lvl1pPr>
+          </a:lstStyle>
+          <a:p>
+            <a:fld id="{FF3FC597-D611-F941-AD14-BA87B43654EE}" type="datetimeFigureOut">
+              <a:rPr lang="en-US" smtClean="0"/>
+              <a:t>12/18/17</a:t>
+            </a:fld>
+            <a:endParaRPr lang="en-US"/>
+          </a:p>
+        </p:txBody>
+      </p:sp>
+      <p:sp>
+        <p:nvSpPr>
+          <p:cNvPr id="4" name="Slide Image Placeholder 3"/>
+          <p:cNvSpPr>
+            <a:spLocks noGrp="1" noRot="1" noChangeAspect="1"/>
+          </p:cNvSpPr>
+          <p:nvPr>
+            <p:ph type="sldImg" idx="2"/>
+          </p:nvPr>
+        </p:nvSpPr>
+        <p:spPr>
+          <a:xfrm>
+            <a:off x="685800" y="1143000"/>
+            <a:ext cx="5486400" cy="3086100"/>
+          </a:xfrm>
+          <a:prstGeom prst="rect">
+            <a:avLst/>
+          </a:prstGeom>
+          <a:noFill/>
+          <a:ln w="12700">
+            <a:solidFill>
+              <a:prstClr val="black"/>
+            </a:solidFill>
+          </a:ln>
+        </p:spPr>
+        <p:txBody>
+          <a:bodyPr vert="horz" lIns="91440" tIns="45720" rIns="91440" bIns="45720" rtlCol="0" anchor="ctr"/>
+          <a:lstStyle/>
+          <a:p>
+            <a:endParaRPr lang="en-US"/>
+          </a:p>
+        </p:txBody>
+      </p:sp>
+      <p:sp>
+        <p:nvSpPr>
+          <p:cNvPr id="5" name="Notes Placeholder 4"/>
+          <p:cNvSpPr>
+            <a:spLocks noGrp="1"/>
+          </p:cNvSpPr>
+          <p:nvPr>
+            <p:ph type="body" sz="quarter" idx="3"/>
+          </p:nvPr>
+        </p:nvSpPr>
+        <p:spPr>
+          <a:xfrm>
+            <a:off x="685800" y="4400550"/>
+            <a:ext cx="5486400" cy="3600450"/>
+          </a:xfrm>
+          <a:prstGeom prst="rect">
+            <a:avLst/>
+          </a:prstGeom>
+        </p:spPr>
+        <p:txBody>
+          <a:bodyPr vert="horz" lIns="91440" tIns="45720" rIns="91440" bIns="45720" rtlCol="0"/>
+          <a:lstStyle/>
+          <a:p>
+            <a:pPr lvl="0"/>
+            <a:r>
+              <a:rPr lang="en-US" smtClean="0"/>
+              <a:t>Click to edit Master text styles</a:t>
+            </a:r>
+          </a:p>
+          <a:p>
+            <a:pPr lvl="1"/>
+            <a:r>
+              <a:rPr lang="en-US" smtClean="0"/>
+              <a:t>Second level</a:t>
+            </a:r>
+          </a:p>
+          <a:p>
+            <a:pPr lvl="2"/>
+            <a:r>
+              <a:rPr lang="en-US" smtClean="0"/>
+              <a:t>Third level</a:t>
+            </a:r>
+          </a:p>
+          <a:p>
+            <a:pPr lvl="3"/>
+            <a:r>
+              <a:rPr lang="en-US" smtClean="0"/>
+              <a:t>Fourth level</a:t>
+            </a:r>
+          </a:p>
+          <a:p>
+            <a:pPr lvl="4"/>
+            <a:r>
+              <a:rPr lang="en-US" smtClean="0"/>
+              <a:t>Fifth level</a:t>
+            </a:r>
+            <a:endParaRPr lang="en-US"/>
+          </a:p>
+        </p:txBody>
+      </p:sp>
+      <p:sp>
+        <p:nvSpPr>
+          <p:cNvPr id="6" name="Footer Placeholder 5"/>
+          <p:cNvSpPr>
+            <a:spLocks noGrp="1"/>
+          </p:cNvSpPr>
+          <p:nvPr>
+            <p:ph type="ftr" sz="quarter" idx="4"/>
+          </p:nvPr>
+        </p:nvSpPr>
+        <p:spPr>
+          <a:xfrm>
+            <a:off x="0" y="8685213"/>
+            <a:ext cx="2971800" cy="458787"/>
+          </a:xfrm>
+          <a:prstGeom prst="rect">
+            <a:avLst/>
+          </a:prstGeom>
+        </p:spPr>
+        <p:txBody>
+          <a:bodyPr vert="horz" lIns="91440" tIns="45720" rIns="91440" bIns="45720" rtlCol="0" anchor="b"/>
+          <a:lstStyle>
+            <a:lvl1pPr algn="l">
+              <a:defRPr sz="1200"/>
+            </a:lvl1pPr>
+          </a:lstStyle>
+          <a:p>
+            <a:endParaRPr lang="en-US"/>
+          </a:p>
+        </p:txBody>
+      </p:sp>
+      <p:sp>
+        <p:nvSpPr>
+          <p:cNvPr id="7" name="Slide Number Placeholder 6"/>
+          <p:cNvSpPr>
+            <a:spLocks noGrp="1"/>
+          </p:cNvSpPr>
+          <p:nvPr>
+            <p:ph type="sldNum" sz="quarter" idx="5"/>
+          </p:nvPr>
+        </p:nvSpPr>
+        <p:spPr>
+          <a:xfrm>
+            <a:off x="3884613" y="8685213"/>
+            <a:ext cx="2971800" cy="458787"/>
+          </a:xfrm>
+          <a:prstGeom prst="rect">
+            <a:avLst/>
+          </a:prstGeom>
+        </p:spPr>
+        <p:txBody>
+          <a:bodyPr vert="horz" lIns="91440" tIns="45720" rIns="91440" bIns="45720" rtlCol="0" anchor="b"/>
+          <a:lstStyle>
+            <a:lvl1pPr algn="r">
+              <a:defRPr sz="1200"/>
+            </a:lvl1pPr>
+          </a:lstStyle>
+          <a:p>
+            <a:fld id="{921E5821-E3CE-2C40-B128-57624E208B2B}" type="slidenum">
+              <a:rPr lang="en-US" smtClean="0"/>
+              <a:t>‹#›</a:t>
+            </a:fld>
+            <a:endParaRPr lang="en-US"/>
+          </a:p>
+        </p:txBody>
+      </p:sp>
+    </p:spTree>
+    <p:extLst>
+      <p:ext uri="{BB962C8B-B14F-4D97-AF65-F5344CB8AC3E}">
+        <p14:creationId xmlns:p14="http://schemas.microsoft.com/office/powerpoint/2010/main" val="1713981939"/>
+      </p:ext>
+    </p:extLst>
+  </p:cSld>
+  <p:clrMap bg1="lt1" tx1="dk1" bg2="lt2" tx2="dk2" accent1="accent1" accent2="accent2" accent3="accent3" accent4="accent4" accent5="accent5" accent6="accent6" hlink="hlink" folHlink="folHlink"/>
+  <p:notesStyle>
+    <a:lvl1pPr marL="0" algn="l" defTabSz="914400" rtl="0" eaLnBrk="1" latinLnBrk="0" hangingPunct="1">
+      <a:defRPr sz="1200" kern="1200">
+        <a:solidFill>
+          <a:schemeClr val="tx1"/>
+        </a:solidFill>
+        <a:latin typeface="+mn-lt"/>
+        <a:ea typeface="+mn-ea"/>
+        <a:cs typeface="+mn-cs"/>
+      </a:defRPr>
+    </a:lvl1pPr>
+    <a:lvl2pPr marL="457200" algn="l" defTabSz="914400" rtl="0" eaLnBrk="1" latinLnBrk="0" hangingPunct="1">
+      <a:defRPr sz="1200" kern="1200">
+        <a:solidFill>
+          <a:schemeClr val="tx1"/>
+        </a:solidFill>
+        <a:latin typeface="+mn-lt"/>
+        <a:ea typeface="+mn-ea"/>
+        <a:cs typeface="+mn-cs"/>
+      </a:defRPr>
+    </a:lvl2pPr>
+    <a:lvl3pPr marL="914400" algn="l" defTabSz="914400" rtl="0" eaLnBrk="1" latinLnBrk="0" hangingPunct="1">
+      <a:defRPr sz="1200" kern="1200">
+        <a:solidFill>
+          <a:schemeClr val="tx1"/>
+        </a:solidFill>
+        <a:latin typeface="+mn-lt"/>
+        <a:ea typeface="+mn-ea"/>
+        <a:cs typeface="+mn-cs"/>
+      </a:defRPr>
+    </a:lvl3pPr>
+    <a:lvl4pPr marL="1371600" algn="l" defTabSz="914400" rtl="0" eaLnBrk="1" latinLnBrk="0" hangingPunct="1">
+      <a:defRPr sz="1200" kern="1200">
+        <a:solidFill>
+          <a:schemeClr val="tx1"/>
+        </a:solidFill>
+        <a:latin typeface="+mn-lt"/>
+        <a:ea typeface="+mn-ea"/>
+        <a:cs typeface="+mn-cs"/>
+      </a:defRPr>
+    </a:lvl4pPr>
+    <a:lvl5pPr marL="1828800" algn="l" defTabSz="914400" rtl="0" eaLnBrk="1" latinLnBrk="0" hangingPunct="1">
+      <a:defRPr sz="1200" kern="1200">
+        <a:solidFill>
+          <a:schemeClr val="tx1"/>
+        </a:solidFill>
+        <a:latin typeface="+mn-lt"/>
+        <a:ea typeface="+mn-ea"/>
+        <a:cs typeface="+mn-cs"/>
+      </a:defRPr>
+    </a:lvl5pPr>
+    <a:lvl6pPr marL="2286000" algn="l" defTabSz="914400" rtl="0" eaLnBrk="1" latinLnBrk="0" hangingPunct="1">
+      <a:defRPr sz="1200" kern="1200">
+        <a:solidFill>
+          <a:schemeClr val="tx1"/>
+        </a:solidFill>
+        <a:latin typeface="+mn-lt"/>
+        <a:ea typeface="+mn-ea"/>
+        <a:cs typeface="+mn-cs"/>
+      </a:defRPr>
+    </a:lvl6pPr>
+    <a:lvl7pPr marL="2743200" algn="l" defTabSz="914400" rtl="0" eaLnBrk="1" latinLnBrk="0" hangingPunct="1">
+      <a:defRPr sz="1200" kern="1200">
+        <a:solidFill>
+          <a:schemeClr val="tx1"/>
+        </a:solidFill>
+        <a:latin typeface="+mn-lt"/>
+        <a:ea typeface="+mn-ea"/>
+        <a:cs typeface="+mn-cs"/>
+      </a:defRPr>
+    </a:lvl7pPr>
+    <a:lvl8pPr marL="3200400" algn="l" defTabSz="914400" rtl="0" eaLnBrk="1" latinLnBrk="0" hangingPunct="1">
+      <a:defRPr sz="1200" kern="1200">
+        <a:solidFill>
+          <a:schemeClr val="tx1"/>
+        </a:solidFill>
+        <a:latin typeface="+mn-lt"/>
+        <a:ea typeface="+mn-ea"/>
+        <a:cs typeface="+mn-cs"/>
+      </a:defRPr>
+    </a:lvl8pPr>
+    <a:lvl9pPr marL="3657600" algn="l" defTabSz="914400" rtl="0" eaLnBrk="1" latinLnBrk="0" hangingPunct="1">
+      <a:defRPr sz="1200" kern="1200">
+        <a:solidFill>
+          <a:schemeClr val="tx1"/>
+        </a:solidFill>
+        <a:latin typeface="+mn-lt"/>
+        <a:ea typeface="+mn-ea"/>
+        <a:cs typeface="+mn-cs"/>
+      </a:defRPr>
+    </a:lvl9pPr>
+  </p:notesStyle>
+</p:notesMaster>
 </file>
 
 <file path=ppt/slideLayouts/slideLayout1.xml><?xml version="1.0" encoding="utf-8"?>
@@ -239,7 +597,7 @@
           <a:p>
             <a:fld id="{0EF0CCB2-20CE-EB4E-9746-AFB7A98072E8}" type="datetimeFigureOut">
               <a:rPr lang="en-US" smtClean="0"/>
-              <a:t>8/21/17</a:t>
+              <a:t>12/18/17</a:t>
             </a:fld>
             <a:endParaRPr lang="en-US"/>
           </a:p>
@@ -409,7 +767,7 @@
           <a:p>
             <a:fld id="{0EF0CCB2-20CE-EB4E-9746-AFB7A98072E8}" type="datetimeFigureOut">
               <a:rPr lang="en-US" smtClean="0"/>
-              <a:t>8/21/17</a:t>
+              <a:t>12/18/17</a:t>
             </a:fld>
             <a:endParaRPr lang="en-US"/>
           </a:p>
@@ -589,7 +947,7 @@
           <a:p>
             <a:fld id="{0EF0CCB2-20CE-EB4E-9746-AFB7A98072E8}" type="datetimeFigureOut">
               <a:rPr lang="en-US" smtClean="0"/>
-              <a:t>8/21/17</a:t>
+              <a:t>12/18/17</a:t>
             </a:fld>
             <a:endParaRPr lang="en-US"/>
           </a:p>
@@ -759,7 +1117,7 @@
           <a:p>
             <a:fld id="{0EF0CCB2-20CE-EB4E-9746-AFB7A98072E8}" type="datetimeFigureOut">
               <a:rPr lang="en-US" smtClean="0"/>
-              <a:t>8/21/17</a:t>
+              <a:t>12/18/17</a:t>
             </a:fld>
             <a:endParaRPr lang="en-US"/>
           </a:p>
@@ -1005,7 +1363,7 @@
           <a:p>
             <a:fld id="{0EF0CCB2-20CE-EB4E-9746-AFB7A98072E8}" type="datetimeFigureOut">
               <a:rPr lang="en-US" smtClean="0"/>
-              <a:t>8/21/17</a:t>
+              <a:t>12/18/17</a:t>
             </a:fld>
             <a:endParaRPr lang="en-US"/>
           </a:p>
@@ -1237,7 +1595,7 @@
           <a:p>
             <a:fld id="{0EF0CCB2-20CE-EB4E-9746-AFB7A98072E8}" type="datetimeFigureOut">
               <a:rPr lang="en-US" smtClean="0"/>
-              <a:t>8/21/17</a:t>
+              <a:t>12/18/17</a:t>
             </a:fld>
             <a:endParaRPr lang="en-US"/>
           </a:p>
@@ -1604,7 +1962,7 @@
           <a:p>
             <a:fld id="{0EF0CCB2-20CE-EB4E-9746-AFB7A98072E8}" type="datetimeFigureOut">
               <a:rPr lang="en-US" smtClean="0"/>
-              <a:t>8/21/17</a:t>
+              <a:t>12/18/17</a:t>
             </a:fld>
             <a:endParaRPr lang="en-US"/>
           </a:p>
@@ -1722,7 +2080,7 @@
           <a:p>
             <a:fld id="{0EF0CCB2-20CE-EB4E-9746-AFB7A98072E8}" type="datetimeFigureOut">
               <a:rPr lang="en-US" smtClean="0"/>
-              <a:t>8/21/17</a:t>
+              <a:t>12/18/17</a:t>
             </a:fld>
             <a:endParaRPr lang="en-US"/>
           </a:p>
@@ -1817,7 +2175,7 @@
           <a:p>
             <a:fld id="{0EF0CCB2-20CE-EB4E-9746-AFB7A98072E8}" type="datetimeFigureOut">
               <a:rPr lang="en-US" smtClean="0"/>
-              <a:t>8/21/17</a:t>
+              <a:t>12/18/17</a:t>
             </a:fld>
             <a:endParaRPr lang="en-US"/>
           </a:p>
@@ -2094,7 +2452,7 @@
           <a:p>
             <a:fld id="{0EF0CCB2-20CE-EB4E-9746-AFB7A98072E8}" type="datetimeFigureOut">
               <a:rPr lang="en-US" smtClean="0"/>
-              <a:t>8/21/17</a:t>
+              <a:t>12/18/17</a:t>
             </a:fld>
             <a:endParaRPr lang="en-US"/>
           </a:p>
@@ -2347,7 +2705,7 @@
           <a:p>
             <a:fld id="{0EF0CCB2-20CE-EB4E-9746-AFB7A98072E8}" type="datetimeFigureOut">
               <a:rPr lang="en-US" smtClean="0"/>
-              <a:t>8/21/17</a:t>
+              <a:t>12/18/17</a:t>
             </a:fld>
             <a:endParaRPr lang="en-US"/>
           </a:p>
@@ -2560,7 +2918,7 @@
           <a:p>
             <a:fld id="{0EF0CCB2-20CE-EB4E-9746-AFB7A98072E8}" type="datetimeFigureOut">
               <a:rPr lang="en-US" smtClean="0"/>
-              <a:t>8/21/17</a:t>
+              <a:t>12/18/17</a:t>
             </a:fld>
             <a:endParaRPr lang="en-US"/>
           </a:p>
@@ -3326,82 +3684,37 @@
             </p:txBody>
           </p:sp>
         </p:grpSp>
-        <p:grpSp>
-          <p:nvGrpSpPr>
-            <p:cNvPr id="44" name="Group 43"/>
-            <p:cNvGrpSpPr/>
+        <p:sp>
+          <p:nvSpPr>
+            <p:cNvPr id="24" name="TextBox 23"/>
+            <p:cNvSpPr txBox="1"/>
             <p:nvPr/>
-          </p:nvGrpSpPr>
-          <p:grpSpPr>
+          </p:nvSpPr>
+          <p:spPr>
             <a:xfrm>
-              <a:off x="7672451" y="1239813"/>
-              <a:ext cx="2226470" cy="1715966"/>
-              <a:chOff x="7672451" y="1239813"/>
-              <a:chExt cx="2226470" cy="1715966"/>
+              <a:off x="7992935" y="2586447"/>
+              <a:ext cx="1585502" cy="369332"/>
             </a:xfrm>
-          </p:grpSpPr>
-          <p:pic>
-            <p:nvPicPr>
-              <p:cNvPr id="12" name="Picture 11"/>
-              <p:cNvPicPr>
-                <a:picLocks noChangeAspect="1"/>
-              </p:cNvPicPr>
-              <p:nvPr/>
-            </p:nvPicPr>
-            <p:blipFill>
-              <a:blip r:embed="rId4">
-                <a:extLst>
-                  <a:ext uri="{28A0092B-C50C-407E-A947-70E740481C1C}">
-                    <a14:useLocalDpi xmlns:a14="http://schemas.microsoft.com/office/drawing/2010/main" val="0"/>
-                  </a:ext>
-                </a:extLst>
-              </a:blip>
-              <a:stretch>
-                <a:fillRect/>
-              </a:stretch>
-            </p:blipFill>
-            <p:spPr>
-              <a:xfrm>
-                <a:off x="7672451" y="1239813"/>
-                <a:ext cx="2226470" cy="1484313"/>
-              </a:xfrm>
-              <a:prstGeom prst="rect">
-                <a:avLst/>
-              </a:prstGeom>
-            </p:spPr>
-          </p:pic>
-          <p:sp>
-            <p:nvSpPr>
-              <p:cNvPr id="24" name="TextBox 23"/>
-              <p:cNvSpPr txBox="1"/>
-              <p:nvPr/>
-            </p:nvSpPr>
-            <p:spPr>
-              <a:xfrm>
-                <a:off x="7992935" y="2586447"/>
-                <a:ext cx="1585502" cy="369332"/>
-              </a:xfrm>
-              <a:prstGeom prst="rect">
-                <a:avLst/>
-              </a:prstGeom>
-              <a:noFill/>
-            </p:spPr>
-            <p:txBody>
-              <a:bodyPr wrap="square" rtlCol="0">
-                <a:spAutoFit/>
-              </a:bodyPr>
-              <a:lstStyle/>
-              <a:p>
-                <a:pPr algn="ctr"/>
-                <a:r>
-                  <a:rPr lang="en-US" dirty="0" smtClean="0"/>
-                  <a:t>Visualization</a:t>
-                </a:r>
-                <a:endParaRPr lang="en-US" dirty="0"/>
-              </a:p>
-            </p:txBody>
-          </p:sp>
-        </p:grpSp>
+            <a:prstGeom prst="rect">
+              <a:avLst/>
+            </a:prstGeom>
+            <a:noFill/>
+          </p:spPr>
+          <p:txBody>
+            <a:bodyPr wrap="square" rtlCol="0">
+              <a:spAutoFit/>
+            </a:bodyPr>
+            <a:lstStyle/>
+            <a:p>
+              <a:pPr algn="ctr"/>
+              <a:r>
+                <a:rPr lang="en-US" dirty="0" smtClean="0"/>
+                <a:t>Visualization</a:t>
+              </a:r>
+              <a:endParaRPr lang="en-US" dirty="0"/>
+            </a:p>
+          </p:txBody>
+        </p:sp>
         <p:cxnSp>
           <p:nvCxnSpPr>
             <p:cNvPr id="34" name="Straight Connector 33"/>
@@ -3834,6 +4147,36 @@
           </p:txBody>
         </p:sp>
       </p:grpSp>
+      <p:pic>
+        <p:nvPicPr>
+          <p:cNvPr id="26" name="Picture 25"/>
+          <p:cNvPicPr>
+            <a:picLocks noChangeAspect="1"/>
+          </p:cNvPicPr>
+          <p:nvPr/>
+        </p:nvPicPr>
+        <p:blipFill>
+          <a:blip r:embed="rId2">
+            <a:extLst>
+              <a:ext uri="{28A0092B-C50C-407E-A947-70E740481C1C}">
+                <a14:useLocalDpi xmlns:a14="http://schemas.microsoft.com/office/drawing/2010/main" val="0"/>
+              </a:ext>
+            </a:extLst>
+          </a:blip>
+          <a:stretch>
+            <a:fillRect/>
+          </a:stretch>
+        </p:blipFill>
+        <p:spPr>
+          <a:xfrm>
+            <a:off x="9002676" y="2113236"/>
+            <a:ext cx="1137644" cy="1137644"/>
+          </a:xfrm>
+          <a:prstGeom prst="rect">
+            <a:avLst/>
+          </a:prstGeom>
+        </p:spPr>
+      </p:pic>
     </p:spTree>
     <p:extLst>
       <p:ext uri="{BB962C8B-B14F-4D97-AF65-F5344CB8AC3E}">
@@ -4113,4 +4456,265 @@
     </a:ext>
   </a:extLst>
 </a:theme>
+</file>
+
+<file path=ppt/theme/theme2.xml><?xml version="1.0" encoding="utf-8"?>
+<a:theme xmlns:a="http://schemas.openxmlformats.org/drawingml/2006/main" name="Office Theme">
+  <a:themeElements>
+    <a:clrScheme name="Office">
+      <a:dk1>
+        <a:sysClr val="windowText" lastClr="000000"/>
+      </a:dk1>
+      <a:lt1>
+        <a:sysClr val="window" lastClr="FFFFFF"/>
+      </a:lt1>
+      <a:dk2>
+        <a:srgbClr val="44546A"/>
+      </a:dk2>
+      <a:lt2>
+        <a:srgbClr val="E7E6E6"/>
+      </a:lt2>
+      <a:accent1>
+        <a:srgbClr val="4472C4"/>
+      </a:accent1>
+      <a:accent2>
+        <a:srgbClr val="ED7D31"/>
+      </a:accent2>
+      <a:accent3>
+        <a:srgbClr val="A5A5A5"/>
+      </a:accent3>
+      <a:accent4>
+        <a:srgbClr val="FFC000"/>
+      </a:accent4>
+      <a:accent5>
+        <a:srgbClr val="5B9BD5"/>
+      </a:accent5>
+      <a:accent6>
+        <a:srgbClr val="70AD47"/>
+      </a:accent6>
+      <a:hlink>
+        <a:srgbClr val="0563C1"/>
+      </a:hlink>
+      <a:folHlink>
+        <a:srgbClr val="954F72"/>
+      </a:folHlink>
+    </a:clrScheme>
+    <a:fontScheme name="Office">
+      <a:majorFont>
+        <a:latin typeface="Calibri Light" panose="020F0302020204030204"/>
+        <a:ea typeface=""/>
+        <a:cs typeface=""/>
+        <a:font script="Jpan" typeface="Yu Gothic Light"/>
+        <a:font script="Hang" typeface="맑은 고딕"/>
+        <a:font script="Hans" typeface="DengXian Light"/>
+        <a:font script="Hant" typeface="新細明體"/>
+        <a:font script="Arab" typeface="Times New Roman"/>
+        <a:font script="Hebr" typeface="Times New Roman"/>
+        <a:font script="Thai" typeface="Angsana New"/>
+        <a:font script="Ethi" typeface="Nyala"/>
+        <a:font script="Beng" typeface="Vrinda"/>
+        <a:font script="Gujr" typeface="Shruti"/>
+        <a:font script="Khmr" typeface="MoolBoran"/>
+        <a:font script="Knda" typeface="Tunga"/>
+        <a:font script="Guru" typeface="Raavi"/>
+        <a:font script="Cans" typeface="Euphemia"/>
+        <a:font script="Cher" typeface="Plantagenet Cherokee"/>
+        <a:font script="Yiii" typeface="Microsoft Yi Baiti"/>
+        <a:font script="Tibt" typeface="Microsoft Himalaya"/>
+        <a:font script="Thaa" typeface="MV Boli"/>
+        <a:font script="Deva" typeface="Mangal"/>
+        <a:font script="Telu" typeface="Gautami"/>
+        <a:font script="Taml" typeface="Latha"/>
+        <a:font script="Syrc" typeface="Estrangelo Edessa"/>
+        <a:font script="Orya" typeface="Kalinga"/>
+        <a:font script="Mlym" typeface="Kartika"/>
+        <a:font script="Laoo" typeface="DokChampa"/>
+        <a:font script="Sinh" typeface="Iskoola Pota"/>
+        <a:font script="Mong" typeface="Mongolian Baiti"/>
+        <a:font script="Viet" typeface="Times New Roman"/>
+        <a:font script="Uigh" typeface="Microsoft Uighur"/>
+        <a:font script="Geor" typeface="Sylfaen"/>
+      </a:majorFont>
+      <a:minorFont>
+        <a:latin typeface="Calibri" panose="020F0502020204030204"/>
+        <a:ea typeface=""/>
+        <a:cs typeface=""/>
+        <a:font script="Jpan" typeface="Yu Gothic"/>
+        <a:font script="Hang" typeface="맑은 고딕"/>
+        <a:font script="Hans" typeface="DengXian"/>
+        <a:font script="Hant" typeface="新細明體"/>
+        <a:font script="Arab" typeface="Arial"/>
+        <a:font script="Hebr" typeface="Arial"/>
+        <a:font script="Thai" typeface="Cordia New"/>
+        <a:font script="Ethi" typeface="Nyala"/>
+        <a:font script="Beng" typeface="Vrinda"/>
+        <a:font script="Gujr" typeface="Shruti"/>
+        <a:font script="Khmr" typeface="DaunPenh"/>
+        <a:font script="Knda" typeface="Tunga"/>
+        <a:font script="Guru" typeface="Raavi"/>
+        <a:font script="Cans" typeface="Euphemia"/>
+        <a:font script="Cher" typeface="Plantagenet Cherokee"/>
+        <a:font script="Yiii" typeface="Microsoft Yi Baiti"/>
+        <a:font script="Tibt" typeface="Microsoft Himalaya"/>
+        <a:font script="Thaa" typeface="MV Boli"/>
+        <a:font script="Deva" typeface="Mangal"/>
+        <a:font script="Telu" typeface="Gautami"/>
+        <a:font script="Taml" typeface="Latha"/>
+        <a:font script="Syrc" typeface="Estrangelo Edessa"/>
+        <a:font script="Orya" typeface="Kalinga"/>
+        <a:font script="Mlym" typeface="Kartika"/>
+        <a:font script="Laoo" typeface="DokChampa"/>
+        <a:font script="Sinh" typeface="Iskoola Pota"/>
+        <a:font script="Mong" typeface="Mongolian Baiti"/>
+        <a:font script="Viet" typeface="Arial"/>
+        <a:font script="Uigh" typeface="Microsoft Uighur"/>
+        <a:font script="Geor" typeface="Sylfaen"/>
+      </a:minorFont>
+    </a:fontScheme>
+    <a:fmtScheme name="Office">
+      <a:fillStyleLst>
+        <a:solidFill>
+          <a:schemeClr val="phClr"/>
+        </a:solidFill>
+        <a:gradFill rotWithShape="1">
+          <a:gsLst>
+            <a:gs pos="0">
+              <a:schemeClr val="phClr">
+                <a:lumMod val="110000"/>
+                <a:satMod val="105000"/>
+                <a:tint val="67000"/>
+              </a:schemeClr>
+            </a:gs>
+            <a:gs pos="50000">
+              <a:schemeClr val="phClr">
+                <a:lumMod val="105000"/>
+                <a:satMod val="103000"/>
+                <a:tint val="73000"/>
+              </a:schemeClr>
+            </a:gs>
+            <a:gs pos="100000">
+              <a:schemeClr val="phClr">
+                <a:lumMod val="105000"/>
+                <a:satMod val="109000"/>
+                <a:tint val="81000"/>
+              </a:schemeClr>
+            </a:gs>
+          </a:gsLst>
+          <a:lin ang="5400000" scaled="0"/>
+        </a:gradFill>
+        <a:gradFill rotWithShape="1">
+          <a:gsLst>
+            <a:gs pos="0">
+              <a:schemeClr val="phClr">
+                <a:satMod val="103000"/>
+                <a:lumMod val="102000"/>
+                <a:tint val="94000"/>
+              </a:schemeClr>
+            </a:gs>
+            <a:gs pos="50000">
+              <a:schemeClr val="phClr">
+                <a:satMod val="110000"/>
+                <a:lumMod val="100000"/>
+                <a:shade val="100000"/>
+              </a:schemeClr>
+            </a:gs>
+            <a:gs pos="100000">
+              <a:schemeClr val="phClr">
+                <a:lumMod val="99000"/>
+                <a:satMod val="120000"/>
+                <a:shade val="78000"/>
+              </a:schemeClr>
+            </a:gs>
+          </a:gsLst>
+          <a:lin ang="5400000" scaled="0"/>
+        </a:gradFill>
+      </a:fillStyleLst>
+      <a:lnStyleLst>
+        <a:ln w="6350" cap="flat" cmpd="sng" algn="ctr">
+          <a:solidFill>
+            <a:schemeClr val="phClr"/>
+          </a:solidFill>
+          <a:prstDash val="solid"/>
+          <a:miter lim="800000"/>
+        </a:ln>
+        <a:ln w="12700" cap="flat" cmpd="sng" algn="ctr">
+          <a:solidFill>
+            <a:schemeClr val="phClr"/>
+          </a:solidFill>
+          <a:prstDash val="solid"/>
+          <a:miter lim="800000"/>
+        </a:ln>
+        <a:ln w="19050" cap="flat" cmpd="sng" algn="ctr">
+          <a:solidFill>
+            <a:schemeClr val="phClr"/>
+          </a:solidFill>
+          <a:prstDash val="solid"/>
+          <a:miter lim="800000"/>
+        </a:ln>
+      </a:lnStyleLst>
+      <a:effectStyleLst>
+        <a:effectStyle>
+          <a:effectLst/>
+        </a:effectStyle>
+        <a:effectStyle>
+          <a:effectLst/>
+        </a:effectStyle>
+        <a:effectStyle>
+          <a:effectLst>
+            <a:outerShdw blurRad="57150" dist="19050" dir="5400000" algn="ctr" rotWithShape="0">
+              <a:srgbClr val="000000">
+                <a:alpha val="63000"/>
+              </a:srgbClr>
+            </a:outerShdw>
+          </a:effectLst>
+        </a:effectStyle>
+      </a:effectStyleLst>
+      <a:bgFillStyleLst>
+        <a:solidFill>
+          <a:schemeClr val="phClr"/>
+        </a:solidFill>
+        <a:solidFill>
+          <a:schemeClr val="phClr">
+            <a:tint val="95000"/>
+            <a:satMod val="170000"/>
+          </a:schemeClr>
+        </a:solidFill>
+        <a:gradFill rotWithShape="1">
+          <a:gsLst>
+            <a:gs pos="0">
+              <a:schemeClr val="phClr">
+                <a:tint val="93000"/>
+                <a:satMod val="150000"/>
+                <a:shade val="98000"/>
+                <a:lumMod val="102000"/>
+              </a:schemeClr>
+            </a:gs>
+            <a:gs pos="50000">
+              <a:schemeClr val="phClr">
+                <a:tint val="98000"/>
+                <a:satMod val="130000"/>
+                <a:shade val="90000"/>
+                <a:lumMod val="103000"/>
+              </a:schemeClr>
+            </a:gs>
+            <a:gs pos="100000">
+              <a:schemeClr val="phClr">
+                <a:shade val="63000"/>
+                <a:satMod val="120000"/>
+              </a:schemeClr>
+            </a:gs>
+          </a:gsLst>
+          <a:lin ang="5400000" scaled="0"/>
+        </a:gradFill>
+      </a:bgFillStyleLst>
+    </a:fmtScheme>
+  </a:themeElements>
+  <a:objectDefaults/>
+  <a:extraClrSchemeLst/>
+  <a:extLst>
+    <a:ext uri="{05A4C25C-085E-4340-85A3-A5531E510DB2}">
+      <thm15:themeFamily xmlns:thm15="http://schemas.microsoft.com/office/thememl/2012/main" name="Office Theme" id="{62F939B6-93AF-4DB8-9C6B-D6C7DFDC589F}" vid="{4A3C46E8-61CC-4603-A589-7422A47A8E4A}"/>
+    </a:ext>
+  </a:extLst>
+</a:theme>
 </file>
</xml_diff>